<commit_message>
add distr semantics slides
</commit_message>
<xml_diff>
--- a/neural_lm_0928.pptx
+++ b/neural_lm_0928.pptx
@@ -235,7 +235,7 @@
           <a:p>
             <a:fld id="{1527065D-CFE8-E24C-A215-C0B70AB19EDA}" type="datetimeFigureOut">
               <a:rPr lang="en-US" smtClean="0"/>
-              <a:t>9/28/18</a:t>
+              <a:t>10/9/18</a:t>
             </a:fld>
             <a:endParaRPr lang="en-US"/>
           </a:p>
@@ -3149,7 +3149,7 @@
           <a:p>
             <a:fld id="{60FA8735-98C6-1A46-B17C-DAA0904BFDD3}" type="datetimeFigureOut">
               <a:rPr lang="en-US" smtClean="0"/>
-              <a:t>9/28/18</a:t>
+              <a:t>10/9/18</a:t>
             </a:fld>
             <a:endParaRPr lang="en-US"/>
           </a:p>
@@ -3319,7 +3319,7 @@
           <a:p>
             <a:fld id="{60FA8735-98C6-1A46-B17C-DAA0904BFDD3}" type="datetimeFigureOut">
               <a:rPr lang="en-US" smtClean="0"/>
-              <a:t>9/28/18</a:t>
+              <a:t>10/9/18</a:t>
             </a:fld>
             <a:endParaRPr lang="en-US"/>
           </a:p>
@@ -3499,7 +3499,7 @@
           <a:p>
             <a:fld id="{60FA8735-98C6-1A46-B17C-DAA0904BFDD3}" type="datetimeFigureOut">
               <a:rPr lang="en-US" smtClean="0"/>
-              <a:t>9/28/18</a:t>
+              <a:t>10/9/18</a:t>
             </a:fld>
             <a:endParaRPr lang="en-US"/>
           </a:p>
@@ -3669,7 +3669,7 @@
           <a:p>
             <a:fld id="{60FA8735-98C6-1A46-B17C-DAA0904BFDD3}" type="datetimeFigureOut">
               <a:rPr lang="en-US" smtClean="0"/>
-              <a:t>9/28/18</a:t>
+              <a:t>10/9/18</a:t>
             </a:fld>
             <a:endParaRPr lang="en-US"/>
           </a:p>
@@ -3915,7 +3915,7 @@
           <a:p>
             <a:fld id="{60FA8735-98C6-1A46-B17C-DAA0904BFDD3}" type="datetimeFigureOut">
               <a:rPr lang="en-US" smtClean="0"/>
-              <a:t>9/28/18</a:t>
+              <a:t>10/9/18</a:t>
             </a:fld>
             <a:endParaRPr lang="en-US"/>
           </a:p>
@@ -4147,7 +4147,7 @@
           <a:p>
             <a:fld id="{60FA8735-98C6-1A46-B17C-DAA0904BFDD3}" type="datetimeFigureOut">
               <a:rPr lang="en-US" smtClean="0"/>
-              <a:t>9/28/18</a:t>
+              <a:t>10/9/18</a:t>
             </a:fld>
             <a:endParaRPr lang="en-US"/>
           </a:p>
@@ -4514,7 +4514,7 @@
           <a:p>
             <a:fld id="{60FA8735-98C6-1A46-B17C-DAA0904BFDD3}" type="datetimeFigureOut">
               <a:rPr lang="en-US" smtClean="0"/>
-              <a:t>9/28/18</a:t>
+              <a:t>10/9/18</a:t>
             </a:fld>
             <a:endParaRPr lang="en-US"/>
           </a:p>
@@ -4632,7 +4632,7 @@
           <a:p>
             <a:fld id="{60FA8735-98C6-1A46-B17C-DAA0904BFDD3}" type="datetimeFigureOut">
               <a:rPr lang="en-US" smtClean="0"/>
-              <a:t>9/28/18</a:t>
+              <a:t>10/9/18</a:t>
             </a:fld>
             <a:endParaRPr lang="en-US"/>
           </a:p>
@@ -4727,7 +4727,7 @@
           <a:p>
             <a:fld id="{60FA8735-98C6-1A46-B17C-DAA0904BFDD3}" type="datetimeFigureOut">
               <a:rPr lang="en-US" smtClean="0"/>
-              <a:t>9/28/18</a:t>
+              <a:t>10/9/18</a:t>
             </a:fld>
             <a:endParaRPr lang="en-US"/>
           </a:p>
@@ -5004,7 +5004,7 @@
           <a:p>
             <a:fld id="{60FA8735-98C6-1A46-B17C-DAA0904BFDD3}" type="datetimeFigureOut">
               <a:rPr lang="en-US" smtClean="0"/>
-              <a:t>9/28/18</a:t>
+              <a:t>10/9/18</a:t>
             </a:fld>
             <a:endParaRPr lang="en-US"/>
           </a:p>
@@ -5257,7 +5257,7 @@
           <a:p>
             <a:fld id="{60FA8735-98C6-1A46-B17C-DAA0904BFDD3}" type="datetimeFigureOut">
               <a:rPr lang="en-US" smtClean="0"/>
-              <a:t>9/28/18</a:t>
+              <a:t>10/9/18</a:t>
             </a:fld>
             <a:endParaRPr lang="en-US"/>
           </a:p>
@@ -5470,7 +5470,7 @@
           <a:p>
             <a:fld id="{60FA8735-98C6-1A46-B17C-DAA0904BFDD3}" type="datetimeFigureOut">
               <a:rPr lang="en-US" smtClean="0"/>
-              <a:t>9/28/18</a:t>
+              <a:t>10/9/18</a:t>
             </a:fld>
             <a:endParaRPr lang="en-US"/>
           </a:p>
@@ -6358,7 +6358,7 @@
           <a:graphicData uri="http://schemas.openxmlformats.org/presentationml/2006/ole">
             <mc:AlternateContent xmlns:mc="http://schemas.openxmlformats.org/markup-compatibility/2006">
               <mc:Choice xmlns:v="urn:schemas-microsoft-com:vml" Requires="v">
-                <p:oleObj spid="_x0000_s72777" name="Equation" r:id="rId3" imgW="1765080" imgH="507960" progId="Equation.3">
+                <p:oleObj spid="_x0000_s72782" name="Equation" r:id="rId3" imgW="1765080" imgH="507960" progId="Equation.3">
                   <p:embed/>
                 </p:oleObj>
               </mc:Choice>
@@ -6708,8 +6708,8 @@
         </p:nvSpPr>
         <p:spPr>
           <a:xfrm>
-            <a:off x="9524868" y="3353944"/>
-            <a:ext cx="661344" cy="473552"/>
+            <a:off x="9575668" y="3328544"/>
+            <a:ext cx="661344" cy="376716"/>
           </a:xfrm>
           <a:prstGeom prst="roundRect">
             <a:avLst/>
@@ -6982,7 +6982,7 @@
           <a:graphicData uri="http://schemas.openxmlformats.org/presentationml/2006/ole">
             <mc:AlternateContent xmlns:mc="http://schemas.openxmlformats.org/markup-compatibility/2006">
               <mc:Choice xmlns:v="urn:schemas-microsoft-com:vml" Requires="v">
-                <p:oleObj spid="_x0000_s74961" name="Equation" r:id="rId4" imgW="2869920" imgH="291960" progId="Equation.3">
+                <p:oleObj spid="_x0000_s74974" name="Equation" r:id="rId4" imgW="2869920" imgH="291960" progId="Equation.3">
                   <p:embed/>
                 </p:oleObj>
               </mc:Choice>
@@ -7039,7 +7039,7 @@
           <a:graphicData uri="http://schemas.openxmlformats.org/presentationml/2006/ole">
             <mc:AlternateContent xmlns:mc="http://schemas.openxmlformats.org/markup-compatibility/2006">
               <mc:Choice xmlns:v="urn:schemas-microsoft-com:vml" Requires="v">
-                <p:oleObj spid="_x0000_s74962" name="Equation" r:id="rId6" imgW="4241520" imgH="457200" progId="Equation.3">
+                <p:oleObj spid="_x0000_s74975" name="Equation" r:id="rId6" imgW="4241520" imgH="457200" progId="Equation.3">
                   <p:embed/>
                 </p:oleObj>
               </mc:Choice>
@@ -7096,7 +7096,7 @@
           <a:graphicData uri="http://schemas.openxmlformats.org/presentationml/2006/ole">
             <mc:AlternateContent xmlns:mc="http://schemas.openxmlformats.org/markup-compatibility/2006">
               <mc:Choice xmlns:v="urn:schemas-microsoft-com:vml" Requires="v">
-                <p:oleObj spid="_x0000_s74963" name="Equation" r:id="rId8" imgW="1739880" imgH="507960" progId="Equation.3">
+                <p:oleObj spid="_x0000_s74976" name="Equation" r:id="rId8" imgW="1739880" imgH="507960" progId="Equation.3">
                   <p:embed/>
                 </p:oleObj>
               </mc:Choice>
@@ -11879,26 +11879,8 @@
                 <a:latin typeface="Times New Roman" panose="02020603050405020304" pitchFamily="18" charset="0"/>
                 <a:cs typeface="Times New Roman" panose="02020603050405020304" pitchFamily="18" charset="0"/>
               </a:rPr>
-              <a:t>Find </a:t>
-            </a:r>
-            <a:r>
-              <a:rPr lang="en-US" sz="2800" dirty="0" smtClean="0">
-                <a:latin typeface="Times New Roman" panose="02020603050405020304" pitchFamily="18" charset="0"/>
-                <a:cs typeface="Times New Roman" panose="02020603050405020304" pitchFamily="18" charset="0"/>
-              </a:rPr>
-              <a:t>parameters that minimize the loss (or maximizes the likelihood</a:t>
-            </a:r>
-            <a:r>
-              <a:rPr lang="en-US" sz="2800" dirty="0" smtClean="0">
-                <a:latin typeface="Times New Roman" panose="02020603050405020304" pitchFamily="18" charset="0"/>
-                <a:cs typeface="Times New Roman" panose="02020603050405020304" pitchFamily="18" charset="0"/>
-              </a:rPr>
-              <a:t>) of the training data.</a:t>
-            </a:r>
-            <a:endParaRPr lang="en-US" sz="2800" dirty="0" smtClean="0">
-              <a:latin typeface="Times New Roman" panose="02020603050405020304" pitchFamily="18" charset="0"/>
-              <a:cs typeface="Times New Roman" panose="02020603050405020304" pitchFamily="18" charset="0"/>
-            </a:endParaRPr>
+              <a:t>Find parameters that minimize the loss (or maximizes the likelihood) of the training data.</a:t>
+            </a:r>
           </a:p>
           <a:p>
             <a:r>
@@ -13202,8 +13184,8 @@
           </p:sp>
         </mc:Fallback>
       </mc:AlternateContent>
-      <mc:AlternateContent xmlns:mc="http://schemas.openxmlformats.org/markup-compatibility/2006">
-        <mc:Choice xmlns:a14="http://schemas.microsoft.com/office/drawing/2010/main" Requires="a14">
+      <mc:AlternateContent xmlns:mc="http://schemas.openxmlformats.org/markup-compatibility/2006" xmlns:a14="http://schemas.microsoft.com/office/drawing/2010/main">
+        <mc:Choice Requires="a14">
           <p:sp>
             <p:nvSpPr>
               <p:cNvPr id="5" name="TextBox 4"/>
@@ -13334,7 +13316,7 @@
             </p:txBody>
           </p:sp>
         </mc:Choice>
-        <mc:Fallback>
+        <mc:Fallback xmlns="">
           <p:sp>
             <p:nvSpPr>
               <p:cNvPr id="5" name="TextBox 4"/>
@@ -13373,8 +13355,8 @@
           </p:sp>
         </mc:Fallback>
       </mc:AlternateContent>
-      <mc:AlternateContent xmlns:mc="http://schemas.openxmlformats.org/markup-compatibility/2006">
-        <mc:Choice xmlns:a14="http://schemas.microsoft.com/office/drawing/2010/main" Requires="a14">
+      <mc:AlternateContent xmlns:mc="http://schemas.openxmlformats.org/markup-compatibility/2006" xmlns:a14="http://schemas.microsoft.com/office/drawing/2010/main">
+        <mc:Choice Requires="a14">
           <p:sp>
             <p:nvSpPr>
               <p:cNvPr id="6" name="TextBox 5"/>
@@ -13486,7 +13468,7 @@
             </p:txBody>
           </p:sp>
         </mc:Choice>
-        <mc:Fallback>
+        <mc:Fallback xmlns="">
           <p:sp>
             <p:nvSpPr>
               <p:cNvPr id="6" name="TextBox 5"/>
@@ -13525,8 +13507,8 @@
           </p:sp>
         </mc:Fallback>
       </mc:AlternateContent>
-      <mc:AlternateContent xmlns:mc="http://schemas.openxmlformats.org/markup-compatibility/2006">
-        <mc:Choice xmlns:a14="http://schemas.microsoft.com/office/drawing/2010/main" Requires="a14">
+      <mc:AlternateContent xmlns:mc="http://schemas.openxmlformats.org/markup-compatibility/2006" xmlns:a14="http://schemas.microsoft.com/office/drawing/2010/main">
+        <mc:Choice Requires="a14">
           <p:sp>
             <p:nvSpPr>
               <p:cNvPr id="9" name="TextBox 8"/>
@@ -13676,7 +13658,7 @@
             </p:txBody>
           </p:sp>
         </mc:Choice>
-        <mc:Fallback>
+        <mc:Fallback xmlns="">
           <p:sp>
             <p:nvSpPr>
               <p:cNvPr id="9" name="TextBox 8"/>
@@ -13715,8 +13697,8 @@
           </p:sp>
         </mc:Fallback>
       </mc:AlternateContent>
-      <mc:AlternateContent xmlns:mc="http://schemas.openxmlformats.org/markup-compatibility/2006">
-        <mc:Choice xmlns:a14="http://schemas.microsoft.com/office/drawing/2010/main" Requires="a14">
+      <mc:AlternateContent xmlns:mc="http://schemas.openxmlformats.org/markup-compatibility/2006" xmlns:a14="http://schemas.microsoft.com/office/drawing/2010/main">
+        <mc:Choice Requires="a14">
           <p:sp>
             <p:nvSpPr>
               <p:cNvPr id="10" name="TextBox 9"/>
@@ -13852,7 +13834,7 @@
             </p:txBody>
           </p:sp>
         </mc:Choice>
-        <mc:Fallback>
+        <mc:Fallback xmlns="">
           <p:sp>
             <p:nvSpPr>
               <p:cNvPr id="10" name="TextBox 9"/>
@@ -20169,8 +20151,8 @@
           </a:p>
         </p:txBody>
       </p:sp>
-      <mc:AlternateContent xmlns:mc="http://schemas.openxmlformats.org/markup-compatibility/2006">
-        <mc:Choice xmlns:a14="http://schemas.microsoft.com/office/drawing/2010/main" Requires="a14">
+      <mc:AlternateContent xmlns:mc="http://schemas.openxmlformats.org/markup-compatibility/2006" xmlns:a14="http://schemas.microsoft.com/office/drawing/2010/main">
+        <mc:Choice Requires="a14">
           <p:sp>
             <p:nvSpPr>
               <p:cNvPr id="8" name="Rectangle 3"/>
@@ -20692,7 +20674,7 @@
             </p:txBody>
           </p:sp>
         </mc:Choice>
-        <mc:Fallback>
+        <mc:Fallback xmlns="">
           <p:sp>
             <p:nvSpPr>
               <p:cNvPr id="8" name="Rectangle 3"/>
@@ -21331,21 +21313,7 @@
                 <a:latin typeface="Times New Roman" panose="02020603050405020304" pitchFamily="18" charset="0"/>
                 <a:cs typeface="Times New Roman" panose="02020603050405020304" pitchFamily="18" charset="0"/>
               </a:rPr>
-              <a:t>Main </a:t>
-            </a:r>
-            <a:r>
-              <a:rPr lang="en-US" dirty="0" smtClean="0">
-                <a:latin typeface="Times New Roman" panose="02020603050405020304" pitchFamily="18" charset="0"/>
-                <a:cs typeface="Times New Roman" panose="02020603050405020304" pitchFamily="18" charset="0"/>
-              </a:rPr>
-              <a:t>idea: make </a:t>
-            </a:r>
-            <a:r>
-              <a:rPr lang="en-US" dirty="0" smtClean="0">
-                <a:latin typeface="Times New Roman" panose="02020603050405020304" pitchFamily="18" charset="0"/>
-                <a:cs typeface="Times New Roman" panose="02020603050405020304" pitchFamily="18" charset="0"/>
-              </a:rPr>
-              <a:t>use of sequential information</a:t>
+              <a:t>Main idea: make use of sequential information</a:t>
             </a:r>
           </a:p>
           <a:p>
@@ -24894,14 +24862,7 @@
                 <a:latin typeface="Times New Roman" panose="02020603050405020304" pitchFamily="18" charset="0"/>
                 <a:cs typeface="Times New Roman" panose="02020603050405020304" pitchFamily="18" charset="0"/>
               </a:rPr>
-              <a:t>RNNs </a:t>
-            </a:r>
-            <a:r>
-              <a:rPr lang="en-US" dirty="0" smtClean="0">
-                <a:latin typeface="Times New Roman" panose="02020603050405020304" pitchFamily="18" charset="0"/>
-                <a:cs typeface="Times New Roman" panose="02020603050405020304" pitchFamily="18" charset="0"/>
-              </a:rPr>
-              <a:t>Extensions</a:t>
+              <a:t>RNNs Extensions</a:t>
             </a:r>
             <a:endParaRPr lang="en-US" dirty="0">
               <a:latin typeface="Times New Roman" panose="02020603050405020304" pitchFamily="18" charset="0"/>
@@ -25293,14 +25254,7 @@
                 <a:latin typeface="Times New Roman" panose="02020603050405020304" pitchFamily="18" charset="0"/>
                 <a:cs typeface="Times New Roman" panose="02020603050405020304" pitchFamily="18" charset="0"/>
               </a:rPr>
-              <a:t>RNNs </a:t>
-            </a:r>
-            <a:r>
-              <a:rPr lang="en-US" dirty="0" smtClean="0">
-                <a:latin typeface="Times New Roman" panose="02020603050405020304" pitchFamily="18" charset="0"/>
-                <a:cs typeface="Times New Roman" panose="02020603050405020304" pitchFamily="18" charset="0"/>
-              </a:rPr>
-              <a:t>Extensions</a:t>
+              <a:t>RNNs Extensions</a:t>
             </a:r>
             <a:endParaRPr lang="en-US" dirty="0">
               <a:latin typeface="Times New Roman" panose="02020603050405020304" pitchFamily="18" charset="0"/>
@@ -28246,19 +28200,8 @@
                 <a:latin typeface="Times New Roman" panose="02020603050405020304" pitchFamily="18" charset="0"/>
                 <a:cs typeface="Times New Roman" panose="02020603050405020304" pitchFamily="18" charset="0"/>
               </a:rPr>
-              <a:t>Key to LSTMs is the </a:t>
-            </a:r>
-            <a:r>
-              <a:rPr lang="en-US" dirty="0" smtClean="0">
-                <a:latin typeface="Times New Roman" panose="02020603050405020304" pitchFamily="18" charset="0"/>
-                <a:cs typeface="Times New Roman" panose="02020603050405020304" pitchFamily="18" charset="0"/>
-              </a:rPr>
-              <a:t>memory cell state</a:t>
-            </a:r>
-            <a:endParaRPr lang="en-US" dirty="0" smtClean="0">
-              <a:latin typeface="Times New Roman" panose="02020603050405020304" pitchFamily="18" charset="0"/>
-              <a:cs typeface="Times New Roman" panose="02020603050405020304" pitchFamily="18" charset="0"/>
-            </a:endParaRPr>
+              <a:t>Key to LSTMs is the memory cell state</a:t>
+            </a:r>
           </a:p>
           <a:p>
             <a:r>
@@ -37056,11 +36999,7 @@
             <a:pPr lvl="1"/>
             <a:r>
               <a:rPr lang="en-GB" dirty="0" smtClean="0"/>
-              <a:t>Neural network </a:t>
-            </a:r>
-            <a:r>
-              <a:rPr lang="en-GB" dirty="0" smtClean="0"/>
-              <a:t>weights: </a:t>
+              <a:t>Neural network weights: </a:t>
             </a:r>
             <a:r>
               <a:rPr lang="en-GB" b="1" dirty="0"/>
@@ -37126,7 +37065,6 @@
               <a:rPr lang="en-GB" baseline="-25000" dirty="0" smtClean="0"/>
               <a:t>V</a:t>
             </a:r>
-            <a:endParaRPr lang="en-GB" baseline="-25000" dirty="0" smtClean="0"/>
           </a:p>
           <a:p>
             <a:r>
@@ -37291,7 +37229,7 @@
             <a:graphicData uri="http://schemas.openxmlformats.org/presentationml/2006/ole">
               <mc:AlternateContent xmlns:mc="http://schemas.openxmlformats.org/markup-compatibility/2006">
                 <mc:Choice xmlns:v="urn:schemas-microsoft-com:vml" Requires="v">
-                  <p:oleObj spid="_x0000_s75985" name="Equation" r:id="rId4" imgW="2869920" imgH="291960" progId="Equation.3">
+                  <p:oleObj spid="_x0000_s75998" name="Equation" r:id="rId4" imgW="2869920" imgH="291960" progId="Equation.3">
                     <p:embed/>
                   </p:oleObj>
                 </mc:Choice>
@@ -37349,7 +37287,7 @@
           <a:graphicData uri="http://schemas.openxmlformats.org/presentationml/2006/ole">
             <mc:AlternateContent xmlns:mc="http://schemas.openxmlformats.org/markup-compatibility/2006">
               <mc:Choice xmlns:v="urn:schemas-microsoft-com:vml" Requires="v">
-                <p:oleObj spid="_x0000_s75986" name="Equation" r:id="rId6" imgW="1866600" imgH="291960" progId="Equation.3">
+                <p:oleObj spid="_x0000_s75999" name="Equation" r:id="rId6" imgW="1866600" imgH="291960" progId="Equation.3">
                   <p:embed/>
                 </p:oleObj>
               </mc:Choice>
@@ -37406,7 +37344,7 @@
           <a:graphicData uri="http://schemas.openxmlformats.org/presentationml/2006/ole">
             <mc:AlternateContent xmlns:mc="http://schemas.openxmlformats.org/markup-compatibility/2006">
               <mc:Choice xmlns:v="urn:schemas-microsoft-com:vml" Requires="v">
-                <p:oleObj spid="_x0000_s75987" name="Equation" r:id="rId8" imgW="876240" imgH="393480" progId="Equation.3">
+                <p:oleObj spid="_x0000_s76000" name="Equation" r:id="rId8" imgW="876240" imgH="393480" progId="Equation.3">
                   <p:embed/>
                 </p:oleObj>
               </mc:Choice>
@@ -38304,7 +38242,7 @@
             <a:graphicData uri="http://schemas.openxmlformats.org/presentationml/2006/ole">
               <mc:AlternateContent xmlns:mc="http://schemas.openxmlformats.org/markup-compatibility/2006">
                 <mc:Choice xmlns:v="urn:schemas-microsoft-com:vml" Requires="v">
-                  <p:oleObj spid="_x0000_s77077" name="Equation" r:id="rId4" imgW="2869920" imgH="291960" progId="Equation.3">
+                  <p:oleObj spid="_x0000_s77094" name="Equation" r:id="rId4" imgW="2869920" imgH="291960" progId="Equation.3">
                     <p:embed/>
                   </p:oleObj>
                 </mc:Choice>
@@ -38358,7 +38296,7 @@
           <a:graphicData uri="http://schemas.openxmlformats.org/presentationml/2006/ole">
             <mc:AlternateContent xmlns:mc="http://schemas.openxmlformats.org/markup-compatibility/2006">
               <mc:Choice xmlns:v="urn:schemas-microsoft-com:vml" Requires="v">
-                <p:oleObj spid="_x0000_s77078" name="Equation" r:id="rId6" imgW="1739880" imgH="507960" progId="Equation.3">
+                <p:oleObj spid="_x0000_s77095" name="Equation" r:id="rId6" imgW="1739880" imgH="507960" progId="Equation.3">
                   <p:embed/>
                 </p:oleObj>
               </mc:Choice>
@@ -38411,7 +38349,7 @@
           <a:graphicData uri="http://schemas.openxmlformats.org/presentationml/2006/ole">
             <mc:AlternateContent xmlns:mc="http://schemas.openxmlformats.org/markup-compatibility/2006">
               <mc:Choice xmlns:v="urn:schemas-microsoft-com:vml" Requires="v">
-                <p:oleObj spid="_x0000_s77079" name="Equation" r:id="rId8" imgW="1752480" imgH="393480" progId="Equation.3">
+                <p:oleObj spid="_x0000_s77096" name="Equation" r:id="rId8" imgW="1752480" imgH="393480" progId="Equation.3">
                   <p:embed/>
                 </p:oleObj>
               </mc:Choice>
@@ -38585,7 +38523,7 @@
             <a:graphicData uri="http://schemas.openxmlformats.org/presentationml/2006/ole">
               <mc:AlternateContent xmlns:mc="http://schemas.openxmlformats.org/markup-compatibility/2006">
                 <mc:Choice xmlns:v="urn:schemas-microsoft-com:vml" Requires="v">
-                  <p:oleObj spid="_x0000_s77080" name="Equation" r:id="rId10" imgW="2476440" imgH="393480" progId="Equation.3">
+                  <p:oleObj spid="_x0000_s77097" name="Equation" r:id="rId10" imgW="2476440" imgH="393480" progId="Equation.3">
                     <p:embed/>
                   </p:oleObj>
                 </mc:Choice>
@@ -40978,7 +40916,7 @@
           <a:graphicData uri="http://schemas.openxmlformats.org/presentationml/2006/ole">
             <mc:AlternateContent xmlns:mc="http://schemas.openxmlformats.org/markup-compatibility/2006">
               <mc:Choice xmlns:v="urn:schemas-microsoft-com:vml" Requires="v">
-                <p:oleObj spid="_x0000_s71957" name="Equation" r:id="rId3" imgW="190440" imgH="228600" progId="Equation.3">
+                <p:oleObj spid="_x0000_s71974" name="Equation" r:id="rId3" imgW="190440" imgH="228600" progId="Equation.3">
                   <p:embed/>
                 </p:oleObj>
               </mc:Choice>
@@ -41750,7 +41688,7 @@
             <a:graphicData uri="http://schemas.openxmlformats.org/presentationml/2006/ole">
               <mc:AlternateContent xmlns:mc="http://schemas.openxmlformats.org/markup-compatibility/2006">
                 <mc:Choice xmlns:v="urn:schemas-microsoft-com:vml" Requires="v">
-                  <p:oleObj spid="_x0000_s71958" name="Equation" r:id="rId5" imgW="164880" imgH="228600" progId="Equation.3">
+                  <p:oleObj spid="_x0000_s71975" name="Equation" r:id="rId5" imgW="164880" imgH="228600" progId="Equation.3">
                     <p:embed/>
                   </p:oleObj>
                 </mc:Choice>
@@ -42526,7 +42464,7 @@
             <a:graphicData uri="http://schemas.openxmlformats.org/presentationml/2006/ole">
               <mc:AlternateContent xmlns:mc="http://schemas.openxmlformats.org/markup-compatibility/2006">
                 <mc:Choice xmlns:v="urn:schemas-microsoft-com:vml" Requires="v">
-                  <p:oleObj spid="_x0000_s71959" name="Equation" r:id="rId7" imgW="342720" imgH="241200" progId="Equation.3">
+                  <p:oleObj spid="_x0000_s71976" name="Equation" r:id="rId7" imgW="342720" imgH="241200" progId="Equation.3">
                     <p:embed/>
                   </p:oleObj>
                 </mc:Choice>
@@ -43531,7 +43469,7 @@
             <a:graphicData uri="http://schemas.openxmlformats.org/presentationml/2006/ole">
               <mc:AlternateContent xmlns:mc="http://schemas.openxmlformats.org/markup-compatibility/2006">
                 <mc:Choice xmlns:v="urn:schemas-microsoft-com:vml" Requires="v">
-                  <p:oleObj spid="_x0000_s71960" name="Equation" r:id="rId9" imgW="152280" imgH="228600" progId="Equation.3">
+                  <p:oleObj spid="_x0000_s71977" name="Equation" r:id="rId9" imgW="152280" imgH="228600" progId="Equation.3">
                     <p:embed/>
                   </p:oleObj>
                 </mc:Choice>

</xml_diff>